<commit_message>
hope we are done frl
</commit_message>
<xml_diff>
--- a/IMAGE CLASSIFICATION OF X-RAY IMAGES FOR PNEUMONIA DETECTION.pptx
+++ b/IMAGE CLASSIFICATION OF X-RAY IMAGES FOR PNEUMONIA DETECTION.pptx
@@ -24,6 +24,7 @@
     <p:sldId id="273" r:id="rId18"/>
     <p:sldId id="265" r:id="rId19"/>
     <p:sldId id="266" r:id="rId20"/>
+    <p:sldId id="278" r:id="rId21"/>
   </p:sldIdLst>
   <p:sldSz cx="12192000" cy="6858000"/>
   <p:notesSz cx="6858000" cy="9144000"/>
@@ -1025,13 +1026,6 @@
         </dgm:presLayoutVars>
       </dgm:prSet>
       <dgm:spPr/>
-      <dgm:t>
-        <a:bodyPr/>
-        <a:lstStyle/>
-        <a:p>
-          <a:endParaRPr lang="en-US"/>
-        </a:p>
-      </dgm:t>
     </dgm:pt>
     <dgm:pt modelId="{D726A96B-B68E-4DF2-B863-EF6610B215A6}" type="pres">
       <dgm:prSet presAssocID="{54E66805-61AC-44C0-B280-4C2FD19890F5}" presName="node" presStyleLbl="node1" presStyleIdx="0" presStyleCnt="3" custScaleX="38465" custScaleY="35138" custLinFactNeighborX="-326" custLinFactNeighborY="-40232">
@@ -1040,13 +1034,6 @@
         </dgm:presLayoutVars>
       </dgm:prSet>
       <dgm:spPr/>
-      <dgm:t>
-        <a:bodyPr/>
-        <a:lstStyle/>
-        <a:p>
-          <a:endParaRPr lang="en-US"/>
-        </a:p>
-      </dgm:t>
     </dgm:pt>
     <dgm:pt modelId="{7392720D-09FF-4A4E-A84D-D93A12D7C13C}" type="pres">
       <dgm:prSet presAssocID="{0E422DC3-D7E2-417E-9FD1-7B99A34B6CFD}" presName="sibTrans" presStyleCnt="0"/>
@@ -1059,13 +1046,6 @@
         </dgm:presLayoutVars>
       </dgm:prSet>
       <dgm:spPr/>
-      <dgm:t>
-        <a:bodyPr/>
-        <a:lstStyle/>
-        <a:p>
-          <a:endParaRPr lang="en-US"/>
-        </a:p>
-      </dgm:t>
     </dgm:pt>
     <dgm:pt modelId="{63AB3669-A12C-4DA1-962F-BFB798424225}" type="pres">
       <dgm:prSet presAssocID="{8344BEC4-C1B4-414E-9511-42379CF1F6D1}" presName="sibTrans" presStyleCnt="0"/>
@@ -1078,23 +1058,16 @@
         </dgm:presLayoutVars>
       </dgm:prSet>
       <dgm:spPr/>
-      <dgm:t>
-        <a:bodyPr/>
-        <a:lstStyle/>
-        <a:p>
-          <a:endParaRPr lang="en-US"/>
-        </a:p>
-      </dgm:t>
     </dgm:pt>
   </dgm:ptLst>
   <dgm:cxnLst>
-    <dgm:cxn modelId="{E3282A46-067E-43FA-9024-1ADE4014E81D}" srcId="{4CDF9A6F-D8A3-47CA-9FF0-B5D8183ED353}" destId="{167DD0CC-BB6E-423C-8FAE-5B77992F46D0}" srcOrd="1" destOrd="0" parTransId="{B35323D7-59BF-4DA4-A8F7-2FF7DF3C761C}" sibTransId="{8344BEC4-C1B4-414E-9511-42379CF1F6D1}"/>
     <dgm:cxn modelId="{048B9205-81F3-4352-ADAB-235218102AF9}" type="presOf" srcId="{4CDF9A6F-D8A3-47CA-9FF0-B5D8183ED353}" destId="{ED6AC645-4140-4B50-B2B0-58F063BE59AE}" srcOrd="0" destOrd="0" presId="urn:microsoft.com/office/officeart/2005/8/layout/default"/>
     <dgm:cxn modelId="{A725435B-AB75-45DB-B421-C68A8E8BCB1F}" srcId="{4CDF9A6F-D8A3-47CA-9FF0-B5D8183ED353}" destId="{54E66805-61AC-44C0-B280-4C2FD19890F5}" srcOrd="0" destOrd="0" parTransId="{5F8E19A9-34E2-451F-B2B8-4843E2F2AFB4}" sibTransId="{0E422DC3-D7E2-417E-9FD1-7B99A34B6CFD}"/>
+    <dgm:cxn modelId="{E3282A46-067E-43FA-9024-1ADE4014E81D}" srcId="{4CDF9A6F-D8A3-47CA-9FF0-B5D8183ED353}" destId="{167DD0CC-BB6E-423C-8FAE-5B77992F46D0}" srcOrd="1" destOrd="0" parTransId="{B35323D7-59BF-4DA4-A8F7-2FF7DF3C761C}" sibTransId="{8344BEC4-C1B4-414E-9511-42379CF1F6D1}"/>
+    <dgm:cxn modelId="{58801567-28EA-4824-83FD-A756CB6C2619}" type="presOf" srcId="{6C8B00A9-FB02-4104-8FDF-B623BF61BE84}" destId="{28A26AEA-099F-47C3-BA26-126D4CF1B80C}" srcOrd="0" destOrd="0" presId="urn:microsoft.com/office/officeart/2005/8/layout/default"/>
     <dgm:cxn modelId="{380B507F-76A7-40F7-9E74-EE78F07CFE3A}" srcId="{4CDF9A6F-D8A3-47CA-9FF0-B5D8183ED353}" destId="{6C8B00A9-FB02-4104-8FDF-B623BF61BE84}" srcOrd="2" destOrd="0" parTransId="{E917312B-3985-40D9-A068-8C7DE95750E4}" sibTransId="{5591B20B-DB1F-447A-92F4-EF9850AB41F2}"/>
     <dgm:cxn modelId="{F80011C1-3E6E-4EE9-B905-FC98B44C56BA}" type="presOf" srcId="{54E66805-61AC-44C0-B280-4C2FD19890F5}" destId="{D726A96B-B68E-4DF2-B863-EF6610B215A6}" srcOrd="0" destOrd="0" presId="urn:microsoft.com/office/officeart/2005/8/layout/default"/>
     <dgm:cxn modelId="{CAC2F5FA-C886-48A2-87D1-FA7661ADF578}" type="presOf" srcId="{167DD0CC-BB6E-423C-8FAE-5B77992F46D0}" destId="{34B36197-35D3-48CC-B814-C3E89FEC541F}" srcOrd="0" destOrd="0" presId="urn:microsoft.com/office/officeart/2005/8/layout/default"/>
-    <dgm:cxn modelId="{58801567-28EA-4824-83FD-A756CB6C2619}" type="presOf" srcId="{6C8B00A9-FB02-4104-8FDF-B623BF61BE84}" destId="{28A26AEA-099F-47C3-BA26-126D4CF1B80C}" srcOrd="0" destOrd="0" presId="urn:microsoft.com/office/officeart/2005/8/layout/default"/>
     <dgm:cxn modelId="{64B3B539-5B68-4439-9D41-1BF5BE20CBF5}" type="presParOf" srcId="{ED6AC645-4140-4B50-B2B0-58F063BE59AE}" destId="{D726A96B-B68E-4DF2-B863-EF6610B215A6}" srcOrd="0" destOrd="0" presId="urn:microsoft.com/office/officeart/2005/8/layout/default"/>
     <dgm:cxn modelId="{6EA2CEAA-5939-4B8C-8050-605029752850}" type="presParOf" srcId="{ED6AC645-4140-4B50-B2B0-58F063BE59AE}" destId="{7392720D-09FF-4A4E-A84D-D93A12D7C13C}" srcOrd="1" destOrd="0" presId="urn:microsoft.com/office/officeart/2005/8/layout/default"/>
     <dgm:cxn modelId="{01CEAD2B-5FF3-40AE-AFE9-1DF6ABAC0A8C}" type="presParOf" srcId="{ED6AC645-4140-4B50-B2B0-58F063BE59AE}" destId="{34B36197-35D3-48CC-B814-C3E89FEC541F}" srcOrd="2" destOrd="0" presId="urn:microsoft.com/office/officeart/2005/8/layout/default"/>
@@ -1173,7 +1146,7 @@
         </a:bodyPr>
         <a:lstStyle/>
         <a:p>
-          <a:pPr lvl="0" algn="ctr" defTabSz="1289050">
+          <a:pPr marL="0" lvl="0" indent="0" algn="ctr" defTabSz="1289050">
             <a:lnSpc>
               <a:spcPct val="90000"/>
             </a:lnSpc>
@@ -1183,6 +1156,7 @@
             <a:spcAft>
               <a:spcPct val="35000"/>
             </a:spcAft>
+            <a:buNone/>
           </a:pPr>
           <a:r>
             <a:rPr lang="en-US" sz="2900" kern="1200" dirty="0"/>
@@ -1190,7 +1164,7 @@
           </a:r>
         </a:p>
         <a:p>
-          <a:pPr lvl="0" algn="ctr" defTabSz="1289050">
+          <a:pPr marL="0" lvl="0" indent="0" algn="ctr" defTabSz="1289050">
             <a:lnSpc>
               <a:spcPct val="90000"/>
             </a:lnSpc>
@@ -1200,6 +1174,7 @@
             <a:spcAft>
               <a:spcPct val="35000"/>
             </a:spcAft>
+            <a:buNone/>
           </a:pPr>
           <a:r>
             <a:rPr lang="en-US" sz="2900" kern="1200" dirty="0"/>
@@ -1266,7 +1241,7 @@
         </a:bodyPr>
         <a:lstStyle/>
         <a:p>
-          <a:pPr lvl="0" algn="ctr" defTabSz="1289050">
+          <a:pPr marL="0" lvl="0" indent="0" algn="ctr" defTabSz="1289050">
             <a:lnSpc>
               <a:spcPct val="90000"/>
             </a:lnSpc>
@@ -1276,6 +1251,7 @@
             <a:spcAft>
               <a:spcPct val="35000"/>
             </a:spcAft>
+            <a:buNone/>
           </a:pPr>
           <a:r>
             <a:rPr lang="en-US" sz="2900" kern="1200" dirty="0"/>
@@ -1283,7 +1259,7 @@
           </a:r>
         </a:p>
         <a:p>
-          <a:pPr lvl="0" algn="ctr" defTabSz="1289050">
+          <a:pPr marL="0" lvl="0" indent="0" algn="ctr" defTabSz="1289050">
             <a:lnSpc>
               <a:spcPct val="90000"/>
             </a:lnSpc>
@@ -1293,6 +1269,7 @@
             <a:spcAft>
               <a:spcPct val="35000"/>
             </a:spcAft>
+            <a:buNone/>
           </a:pPr>
           <a:r>
             <a:rPr lang="en-US" sz="2900" kern="1200" dirty="0"/>
@@ -1359,7 +1336,7 @@
         </a:bodyPr>
         <a:lstStyle/>
         <a:p>
-          <a:pPr lvl="0" algn="ctr" defTabSz="1289050">
+          <a:pPr marL="0" lvl="0" indent="0" algn="ctr" defTabSz="1289050">
             <a:lnSpc>
               <a:spcPct val="90000"/>
             </a:lnSpc>
@@ -1369,6 +1346,7 @@
             <a:spcAft>
               <a:spcPct val="35000"/>
             </a:spcAft>
+            <a:buNone/>
           </a:pPr>
           <a:r>
             <a:rPr lang="en-US" sz="2900" kern="1200" dirty="0"/>
@@ -1376,7 +1354,7 @@
           </a:r>
         </a:p>
         <a:p>
-          <a:pPr lvl="0" algn="ctr" defTabSz="1289050">
+          <a:pPr marL="0" lvl="0" indent="0" algn="ctr" defTabSz="1289050">
             <a:lnSpc>
               <a:spcPct val="90000"/>
             </a:lnSpc>
@@ -1386,6 +1364,7 @@
             <a:spcAft>
               <a:spcPct val="35000"/>
             </a:spcAft>
+            <a:buNone/>
           </a:pPr>
           <a:r>
             <a:rPr lang="en-US" sz="2900" kern="1200" dirty="0"/>
@@ -2829,7 +2808,7 @@
             <a:fld id="{B61BEF0D-F0BB-DE4B-95CE-6DB70DBA9567}" type="datetimeFigureOut">
               <a:rPr lang="en-US" dirty="0"/>
               <a:pPr/>
-              <a:t>7/1/2024</a:t>
+              <a:t>7/2/2024</a:t>
             </a:fld>
             <a:endParaRPr lang="en-US" dirty="0"/>
           </a:p>
@@ -3088,7 +3067,7 @@
             <a:fld id="{B61BEF0D-F0BB-DE4B-95CE-6DB70DBA9567}" type="datetimeFigureOut">
               <a:rPr lang="en-US" dirty="0"/>
               <a:pPr/>
-              <a:t>7/1/2024</a:t>
+              <a:t>7/2/2024</a:t>
             </a:fld>
             <a:endParaRPr lang="en-US" dirty="0"/>
           </a:p>
@@ -3320,7 +3299,7 @@
             <a:fld id="{B61BEF0D-F0BB-DE4B-95CE-6DB70DBA9567}" type="datetimeFigureOut">
               <a:rPr lang="en-US" dirty="0"/>
               <a:pPr/>
-              <a:t>7/1/2024</a:t>
+              <a:t>7/2/2024</a:t>
             </a:fld>
             <a:endParaRPr lang="en-US" dirty="0"/>
           </a:p>
@@ -3557,7 +3536,7 @@
             <a:fld id="{B61BEF0D-F0BB-DE4B-95CE-6DB70DBA9567}" type="datetimeFigureOut">
               <a:rPr lang="en-US" dirty="0"/>
               <a:pPr/>
-              <a:t>7/1/2024</a:t>
+              <a:t>7/2/2024</a:t>
             </a:fld>
             <a:endParaRPr lang="en-US" dirty="0"/>
           </a:p>
@@ -3861,7 +3840,7 @@
             <a:fld id="{B61BEF0D-F0BB-DE4B-95CE-6DB70DBA9567}" type="datetimeFigureOut">
               <a:rPr lang="en-US" dirty="0"/>
               <a:pPr/>
-              <a:t>7/1/2024</a:t>
+              <a:t>7/2/2024</a:t>
             </a:fld>
             <a:endParaRPr lang="en-US" dirty="0"/>
           </a:p>
@@ -4160,7 +4139,7 @@
             <a:fld id="{B61BEF0D-F0BB-DE4B-95CE-6DB70DBA9567}" type="datetimeFigureOut">
               <a:rPr lang="en-US" dirty="0"/>
               <a:pPr/>
-              <a:t>7/1/2024</a:t>
+              <a:t>7/2/2024</a:t>
             </a:fld>
             <a:endParaRPr lang="en-US" dirty="0"/>
           </a:p>
@@ -4579,7 +4558,7 @@
             <a:fld id="{B61BEF0D-F0BB-DE4B-95CE-6DB70DBA9567}" type="datetimeFigureOut">
               <a:rPr lang="en-US" dirty="0"/>
               <a:pPr/>
-              <a:t>7/1/2024</a:t>
+              <a:t>7/2/2024</a:t>
             </a:fld>
             <a:endParaRPr lang="en-US" dirty="0"/>
           </a:p>
@@ -4738,7 +4717,7 @@
             <a:fld id="{B61BEF0D-F0BB-DE4B-95CE-6DB70DBA9567}" type="datetimeFigureOut">
               <a:rPr lang="en-US" dirty="0"/>
               <a:pPr/>
-              <a:t>7/1/2024</a:t>
+              <a:t>7/2/2024</a:t>
             </a:fld>
             <a:endParaRPr lang="en-US" dirty="0"/>
           </a:p>
@@ -4830,7 +4809,7 @@
             <a:fld id="{B61BEF0D-F0BB-DE4B-95CE-6DB70DBA9567}" type="datetimeFigureOut">
               <a:rPr lang="en-US" dirty="0"/>
               <a:pPr/>
-              <a:t>7/1/2024</a:t>
+              <a:t>7/2/2024</a:t>
             </a:fld>
             <a:endParaRPr lang="en-US" dirty="0"/>
           </a:p>
@@ -5205,7 +5184,7 @@
             <a:fld id="{B61BEF0D-F0BB-DE4B-95CE-6DB70DBA9567}" type="datetimeFigureOut">
               <a:rPr lang="en-US" dirty="0"/>
               <a:pPr/>
-              <a:t>7/1/2024</a:t>
+              <a:t>7/2/2024</a:t>
             </a:fld>
             <a:endParaRPr lang="en-US" dirty="0"/>
           </a:p>
@@ -5490,7 +5469,7 @@
             <a:fld id="{B61BEF0D-F0BB-DE4B-95CE-6DB70DBA9567}" type="datetimeFigureOut">
               <a:rPr lang="en-US" dirty="0"/>
               <a:pPr/>
-              <a:t>7/1/2024</a:t>
+              <a:t>7/2/2024</a:t>
             </a:fld>
             <a:endParaRPr lang="en-US" dirty="0"/>
           </a:p>
@@ -5698,7 +5677,7 @@
             <a:fld id="{B61BEF0D-F0BB-DE4B-95CE-6DB70DBA9567}" type="datetimeFigureOut">
               <a:rPr lang="en-US" dirty="0"/>
               <a:pPr/>
-              <a:t>7/1/2024</a:t>
+              <a:t>7/2/2024</a:t>
             </a:fld>
             <a:endParaRPr lang="en-US" dirty="0"/>
           </a:p>
@@ -6450,15 +6429,7 @@
           <a:p>
             <a:r>
               <a:rPr lang="en-US" dirty="0"/>
-              <a:t>S</a:t>
-            </a:r>
-            <a:r>
-              <a:rPr lang="en-US" dirty="0" smtClean="0"/>
-              <a:t>hows </a:t>
-            </a:r>
-            <a:r>
-              <a:rPr lang="en-US" dirty="0"/>
-              <a:t>the variation in dimensions of the x-ray images, which was important for preprocessing steps</a:t>
+              <a:t>Shows the variation in dimensions of the x-ray images, which was important for preprocessing steps</a:t>
             </a:r>
           </a:p>
           <a:p>
@@ -6674,34 +6645,17 @@
           <a:lstStyle/>
           <a:p>
             <a:r>
-              <a:rPr lang="en-US" dirty="0" smtClean="0"/>
-              <a:t>Shows the </a:t>
-            </a:r>
-            <a:r>
               <a:rPr lang="en-US" dirty="0"/>
-              <a:t>shape and proportion of the </a:t>
-            </a:r>
-            <a:r>
-              <a:rPr lang="en-US" dirty="0" smtClean="0"/>
-              <a:t>images.</a:t>
-            </a:r>
+              <a:t>Shows the shape and proportion of the images. </a:t>
+            </a:r>
+          </a:p>
+          <a:p>
+            <a:endParaRPr lang="en-US" dirty="0"/>
+          </a:p>
+          <a:p>
             <a:r>
               <a:rPr lang="en-US" dirty="0"/>
-              <a:t> </a:t>
-            </a:r>
-            <a:endParaRPr lang="en-US" dirty="0" smtClean="0"/>
-          </a:p>
-          <a:p>
-            <a:endParaRPr lang="en-US" dirty="0" smtClean="0"/>
-          </a:p>
-          <a:p>
-            <a:r>
-              <a:rPr lang="en-US" dirty="0" smtClean="0"/>
-              <a:t>The </a:t>
-            </a:r>
-            <a:r>
-              <a:rPr lang="en-US" dirty="0"/>
-              <a:t>aspect ratio distribution indicates that most images have an aspect ratio between 1.0 and 1.5, with a peak around 1.3.</a:t>
+              <a:t>The aspect ratio distribution indicates that most images have an aspect ratio between 1.0 and 1.5, with a peak around 1.3.</a:t>
             </a:r>
           </a:p>
           <a:p>
@@ -6943,26 +6897,9 @@
           <a:lstStyle/>
           <a:p>
             <a:r>
-              <a:rPr lang="en-US" dirty="0" smtClean="0"/>
-              <a:t>Show </a:t>
-            </a:r>
-            <a:r>
               <a:rPr lang="en-US" dirty="0"/>
-              <a:t>the number of images in the dataset for </a:t>
-            </a:r>
-            <a:r>
-              <a:rPr lang="en-US" dirty="0" smtClean="0"/>
-              <a:t>normal(0) </a:t>
-            </a:r>
-            <a:r>
-              <a:rPr lang="en-US" dirty="0"/>
-              <a:t>vs </a:t>
-            </a:r>
-            <a:r>
-              <a:rPr lang="en-US" dirty="0" smtClean="0"/>
-              <a:t>pneumonia(1), with pneumonia being the highest</a:t>
-            </a:r>
-            <a:endParaRPr lang="en-US" dirty="0"/>
+              <a:t>Show the number of images in the dataset for normal(0) vs pneumonia(1), with pneumonia being the highest</a:t>
+            </a:r>
           </a:p>
         </p:txBody>
       </p:sp>
@@ -7013,15 +6950,7 @@
           <a:p>
             <a:r>
               <a:rPr lang="en-US" dirty="0"/>
-              <a:t>BAR GRAPH DISPLAYING  </a:t>
-            </a:r>
-            <a:r>
-              <a:rPr lang="en-US" dirty="0" smtClean="0"/>
-              <a:t>TEST </a:t>
-            </a:r>
-            <a:r>
-              <a:rPr lang="en-US" dirty="0"/>
-              <a:t>DATA CLASS DISTRIBUTION</a:t>
+              <a:t>BAR GRAPH DISPLAYING  TEST DATA CLASS DISTRIBUTION</a:t>
             </a:r>
           </a:p>
         </p:txBody>
@@ -7078,7 +7007,6 @@
               <a:rPr lang="en-US" dirty="0"/>
               <a:t>Show the number of images in the dataset for normal(0) vs pneumonia(1), with pneumonia being the highest</a:t>
             </a:r>
-            <a:endParaRPr lang="en-US" dirty="0"/>
           </a:p>
         </p:txBody>
       </p:sp>
@@ -7129,15 +7057,7 @@
           <a:p>
             <a:r>
               <a:rPr lang="en-US" dirty="0"/>
-              <a:t>BAR GRAPH DISPLAYING </a:t>
-            </a:r>
-            <a:r>
-              <a:rPr lang="en-US" dirty="0" smtClean="0"/>
-              <a:t>VALIDATION DATA </a:t>
-            </a:r>
-            <a:r>
-              <a:rPr lang="en-US" dirty="0"/>
-              <a:t>CLASS DISTRIBUTION</a:t>
+              <a:t>BAR GRAPH DISPLAYING VALIDATION DATA CLASS DISTRIBUTION</a:t>
             </a:r>
           </a:p>
         </p:txBody>
@@ -7192,29 +7112,8 @@
           <a:p>
             <a:r>
               <a:rPr lang="en-US" dirty="0"/>
-              <a:t>Show the number of images in the </a:t>
-            </a:r>
-            <a:r>
-              <a:rPr lang="en-US" dirty="0" smtClean="0"/>
-              <a:t>dataset </a:t>
-            </a:r>
-            <a:r>
-              <a:rPr lang="en-US" dirty="0"/>
-              <a:t>for normal(0) vs pneumonia(1), with </a:t>
-            </a:r>
-            <a:r>
-              <a:rPr lang="en-US" dirty="0" smtClean="0"/>
-              <a:t>pneumonia and normal </a:t>
-            </a:r>
-            <a:r>
-              <a:rPr lang="en-US" dirty="0"/>
-              <a:t>being </a:t>
-            </a:r>
-            <a:r>
-              <a:rPr lang="en-US" dirty="0" smtClean="0"/>
-              <a:t>equal</a:t>
-            </a:r>
-            <a:endParaRPr lang="en-US" dirty="0"/>
+              <a:t>Show the number of images in the dataset for normal(0) vs pneumonia(1), with pneumonia and normal being equal</a:t>
+            </a:r>
           </a:p>
         </p:txBody>
       </p:sp>
@@ -7260,32 +7159,82 @@
         </p:nvSpPr>
         <p:spPr/>
         <p:txBody>
-          <a:bodyPr/>
+          <a:bodyPr>
+            <a:normAutofit/>
+          </a:bodyPr>
           <a:lstStyle/>
           <a:p>
             <a:r>
+              <a:rPr lang="en-US" sz="4000" dirty="0"/>
+              <a:t>Model evaluation</a:t>
+            </a:r>
+          </a:p>
+        </p:txBody>
+      </p:sp>
+      <p:pic>
+        <p:nvPicPr>
+          <p:cNvPr id="4" name="Content Placeholder 3">
+            <a:extLst>
+              <a:ext uri="{FF2B5EF4-FFF2-40B4-BE49-F238E27FC236}">
+                <a16:creationId xmlns:a16="http://schemas.microsoft.com/office/drawing/2014/main" id="{47615688-D0AD-CBDA-E31F-8AAE1114942F}"/>
+              </a:ext>
+            </a:extLst>
+          </p:cNvPr>
+          <p:cNvPicPr>
+            <a:picLocks noGrp="1" noChangeAspect="1"/>
+          </p:cNvPicPr>
+          <p:nvPr>
+            <p:ph idx="1"/>
+          </p:nvPr>
+        </p:nvPicPr>
+        <p:blipFill>
+          <a:blip r:embed="rId2"/>
+          <a:stretch>
+            <a:fillRect/>
+          </a:stretch>
+        </p:blipFill>
+        <p:spPr>
+          <a:xfrm>
+            <a:off x="225287" y="1974574"/>
+            <a:ext cx="8083825" cy="4537123"/>
+          </a:xfrm>
+          <a:prstGeom prst="rect">
+            <a:avLst/>
+          </a:prstGeom>
+        </p:spPr>
+      </p:pic>
+      <p:sp>
+        <p:nvSpPr>
+          <p:cNvPr id="5" name="TextBox 4">
+            <a:extLst>
+              <a:ext uri="{FF2B5EF4-FFF2-40B4-BE49-F238E27FC236}">
+                <a16:creationId xmlns:a16="http://schemas.microsoft.com/office/drawing/2014/main" id="{C515DD7E-8540-873C-4A4F-B57C4F45C49A}"/>
+              </a:ext>
+            </a:extLst>
+          </p:cNvPr>
+          <p:cNvSpPr txBox="1"/>
+          <p:nvPr/>
+        </p:nvSpPr>
+        <p:spPr>
+          <a:xfrm>
+            <a:off x="9197009" y="3087756"/>
+            <a:ext cx="2451652" cy="2308324"/>
+          </a:xfrm>
+          <a:prstGeom prst="rect">
+            <a:avLst/>
+          </a:prstGeom>
+          <a:noFill/>
+        </p:spPr>
+        <p:txBody>
+          <a:bodyPr wrap="square" rtlCol="0">
+            <a:spAutoFit/>
+          </a:bodyPr>
+          <a:lstStyle/>
+          <a:p>
+            <a:r>
               <a:rPr lang="en-US" dirty="0"/>
-              <a:t>Model evaluation</a:t>
-            </a:r>
-          </a:p>
-        </p:txBody>
-      </p:sp>
-      <p:sp>
-        <p:nvSpPr>
-          <p:cNvPr id="3" name="Content Placeholder 2"/>
-          <p:cNvSpPr>
-            <a:spLocks noGrp="1"/>
-          </p:cNvSpPr>
-          <p:nvPr>
-            <p:ph idx="1"/>
-          </p:nvPr>
-        </p:nvSpPr>
-        <p:spPr/>
-        <p:txBody>
-          <a:bodyPr/>
-          <a:lstStyle/>
-          <a:p>
-            <a:endParaRPr lang="en-US" dirty="0"/>
+              <a:t>The bar chart compares the performance of the models across training and validation metrics, showing that the Modified CNN model performed better since it had the least loss.</a:t>
+            </a:r>
           </a:p>
         </p:txBody>
       </p:sp>
@@ -7331,30 +7280,83 @@
         </p:nvSpPr>
         <p:spPr/>
         <p:txBody>
-          <a:bodyPr/>
+          <a:bodyPr>
+            <a:normAutofit/>
+          </a:bodyPr>
           <a:lstStyle/>
           <a:p>
             <a:r>
+              <a:rPr lang="en-US" sz="4000" dirty="0"/>
+              <a:t>Model evaluation</a:t>
+            </a:r>
+          </a:p>
+        </p:txBody>
+      </p:sp>
+      <p:pic>
+        <p:nvPicPr>
+          <p:cNvPr id="4" name="Content Placeholder 3">
+            <a:extLst>
+              <a:ext uri="{FF2B5EF4-FFF2-40B4-BE49-F238E27FC236}">
+                <a16:creationId xmlns:a16="http://schemas.microsoft.com/office/drawing/2014/main" id="{9CC3188E-F033-8E6F-1084-44032E2D71B8}"/>
+              </a:ext>
+            </a:extLst>
+          </p:cNvPr>
+          <p:cNvPicPr>
+            <a:picLocks noGrp="1" noChangeAspect="1"/>
+          </p:cNvPicPr>
+          <p:nvPr>
+            <p:ph idx="1"/>
+          </p:nvPr>
+        </p:nvPicPr>
+        <p:blipFill>
+          <a:blip r:embed="rId2"/>
+          <a:stretch>
+            <a:fillRect/>
+          </a:stretch>
+        </p:blipFill>
+        <p:spPr>
+          <a:xfrm>
+            <a:off x="251216" y="1991801"/>
+            <a:ext cx="8201657" cy="4621034"/>
+          </a:xfrm>
+          <a:prstGeom prst="rect">
+            <a:avLst/>
+          </a:prstGeom>
+        </p:spPr>
+      </p:pic>
+      <p:sp>
+        <p:nvSpPr>
+          <p:cNvPr id="6" name="TextBox 5">
+            <a:extLst>
+              <a:ext uri="{FF2B5EF4-FFF2-40B4-BE49-F238E27FC236}">
+                <a16:creationId xmlns:a16="http://schemas.microsoft.com/office/drawing/2014/main" id="{C0FD4227-EB5E-4025-CC41-C77D26EF2896}"/>
+              </a:ext>
+            </a:extLst>
+          </p:cNvPr>
+          <p:cNvSpPr txBox="1"/>
+          <p:nvPr/>
+        </p:nvSpPr>
+        <p:spPr>
+          <a:xfrm>
+            <a:off x="8892208" y="2915478"/>
+            <a:ext cx="2544417" cy="2862322"/>
+          </a:xfrm>
+          <a:prstGeom prst="rect">
+            <a:avLst/>
+          </a:prstGeom>
+          <a:noFill/>
+        </p:spPr>
+        <p:txBody>
+          <a:bodyPr wrap="square" rtlCol="0">
+            <a:spAutoFit/>
+          </a:bodyPr>
+          <a:lstStyle/>
+          <a:p>
+            <a:r>
               <a:rPr lang="en-US" dirty="0"/>
-              <a:t>CONCLUSION</a:t>
-            </a:r>
-          </a:p>
-        </p:txBody>
-      </p:sp>
-      <p:sp>
-        <p:nvSpPr>
-          <p:cNvPr id="3" name="Content Placeholder 2"/>
-          <p:cNvSpPr>
-            <a:spLocks noGrp="1"/>
-          </p:cNvSpPr>
-          <p:nvPr>
-            <p:ph idx="1"/>
-          </p:nvPr>
-        </p:nvSpPr>
-        <p:spPr/>
-        <p:txBody>
-          <a:bodyPr/>
-          <a:lstStyle/>
+              <a:t>The bar chart compares the performance of the models across training and validation metrics, showing that the Modified CNN model performed better since it had the best accuracy levels.</a:t>
+            </a:r>
+          </a:p>
           <a:p>
             <a:endParaRPr lang="en-US" dirty="0"/>
           </a:p>
@@ -7402,12 +7404,14 @@
         </p:nvSpPr>
         <p:spPr/>
         <p:txBody>
-          <a:bodyPr/>
+          <a:bodyPr>
+            <a:normAutofit/>
+          </a:bodyPr>
           <a:lstStyle/>
           <a:p>
             <a:r>
-              <a:rPr lang="en-US" dirty="0"/>
-              <a:t>RECOMMENDATIONS &amp; NEXT STEPS</a:t>
+              <a:rPr lang="en-US" sz="4000" dirty="0"/>
+              <a:t>RECOMMENDATIONS</a:t>
             </a:r>
           </a:p>
         </p:txBody>
@@ -7424,10 +7428,39 @@
         </p:nvSpPr>
         <p:spPr/>
         <p:txBody>
-          <a:bodyPr/>
+          <a:bodyPr>
+            <a:normAutofit/>
+          </a:bodyPr>
           <a:lstStyle/>
           <a:p>
-            <a:endParaRPr lang="en-US" dirty="0"/>
+            <a:r>
+              <a:rPr lang="en-US" sz="2400" dirty="0"/>
+              <a:t>Regularization: Prevent overfitting and enhance generalization.</a:t>
+            </a:r>
+          </a:p>
+          <a:p>
+            <a:r>
+              <a:rPr lang="en-US" sz="2400" dirty="0"/>
+              <a:t>Hyperparameter Tuning: Optimize model configurations for peak performance.</a:t>
+            </a:r>
+          </a:p>
+          <a:p>
+            <a:r>
+              <a:rPr lang="en-US" sz="2400" dirty="0"/>
+              <a:t>Ensemble Methods: Combine diverse models for improved accuracy and robustness.</a:t>
+            </a:r>
+          </a:p>
+          <a:p>
+            <a:r>
+              <a:rPr lang="en-US" sz="2400" dirty="0"/>
+              <a:t>Cross-Validation: Rigorously assess model performance across multiple data splits.</a:t>
+            </a:r>
+          </a:p>
+          <a:p>
+            <a:r>
+              <a:rPr lang="en-US" sz="2400" dirty="0"/>
+              <a:t>Data Augmentation: Expose models to diverse data to improve real-world capabilities.</a:t>
+            </a:r>
           </a:p>
         </p:txBody>
       </p:sp>
@@ -7523,6 +7556,119 @@
 </p:sld>
 </file>
 
+<file path=ppt/slides/slide20.xml><?xml version="1.0" encoding="utf-8"?>
+<p:sld xmlns:a="http://schemas.openxmlformats.org/drawingml/2006/main" xmlns:r="http://schemas.openxmlformats.org/officeDocument/2006/relationships" xmlns:p="http://schemas.openxmlformats.org/presentationml/2006/main">
+  <p:cSld>
+    <p:spTree>
+      <p:nvGrpSpPr>
+        <p:cNvPr id="1" name=""/>
+        <p:cNvGrpSpPr/>
+        <p:nvPr/>
+      </p:nvGrpSpPr>
+      <p:grpSpPr>
+        <a:xfrm>
+          <a:off x="0" y="0"/>
+          <a:ext cx="0" cy="0"/>
+          <a:chOff x="0" y="0"/>
+          <a:chExt cx="0" cy="0"/>
+        </a:xfrm>
+      </p:grpSpPr>
+      <p:sp>
+        <p:nvSpPr>
+          <p:cNvPr id="2" name="Title 1">
+            <a:extLst>
+              <a:ext uri="{FF2B5EF4-FFF2-40B4-BE49-F238E27FC236}">
+                <a16:creationId xmlns:a16="http://schemas.microsoft.com/office/drawing/2014/main" id="{C1267BFA-CA22-0AB6-B75B-C6A8A8ADB198}"/>
+              </a:ext>
+            </a:extLst>
+          </p:cNvPr>
+          <p:cNvSpPr>
+            <a:spLocks noGrp="1"/>
+          </p:cNvSpPr>
+          <p:nvPr>
+            <p:ph type="title"/>
+          </p:nvPr>
+        </p:nvSpPr>
+        <p:spPr/>
+        <p:txBody>
+          <a:bodyPr>
+            <a:normAutofit/>
+          </a:bodyPr>
+          <a:lstStyle/>
+          <a:p>
+            <a:r>
+              <a:rPr lang="en-US" sz="4800" dirty="0"/>
+              <a:t>NEXT STEPS</a:t>
+            </a:r>
+          </a:p>
+        </p:txBody>
+      </p:sp>
+      <p:sp>
+        <p:nvSpPr>
+          <p:cNvPr id="3" name="Content Placeholder 2">
+            <a:extLst>
+              <a:ext uri="{FF2B5EF4-FFF2-40B4-BE49-F238E27FC236}">
+                <a16:creationId xmlns:a16="http://schemas.microsoft.com/office/drawing/2014/main" id="{3D200811-03DF-98AB-2C9A-FA1AFE0FFF84}"/>
+              </a:ext>
+            </a:extLst>
+          </p:cNvPr>
+          <p:cNvSpPr>
+            <a:spLocks noGrp="1"/>
+          </p:cNvSpPr>
+          <p:nvPr>
+            <p:ph idx="1"/>
+          </p:nvPr>
+        </p:nvSpPr>
+        <p:spPr>
+          <a:xfrm>
+            <a:off x="318052" y="2027583"/>
+            <a:ext cx="11622157" cy="4651513"/>
+          </a:xfrm>
+        </p:spPr>
+        <p:txBody>
+          <a:bodyPr>
+            <a:normAutofit/>
+          </a:bodyPr>
+          <a:lstStyle/>
+          <a:p>
+            <a:r>
+              <a:rPr lang="en-US" sz="2400" dirty="0"/>
+              <a:t>Severity Assessment: Beyond identifying pneumonia's presence, the AI model can determine its severity (mild, moderate, severe), providing clinicians with crucial information for treatment decisions.</a:t>
+            </a:r>
+          </a:p>
+          <a:p>
+            <a:r>
+              <a:rPr lang="en-US" sz="2400" dirty="0"/>
+              <a:t>Pneumonia Type Identification: Differentiating between bacterial and viral pneumonia can guide appropriate treatment plans, as antibiotics are only effective for bacterial infections.</a:t>
+            </a:r>
+          </a:p>
+          <a:p>
+            <a:r>
+              <a:rPr lang="en-US" sz="2400" dirty="0"/>
+              <a:t>Precise Localization: The model can pinpoint the specific lung areas affected by pneumonia, aiding further investigation and targeted treatment.</a:t>
+            </a:r>
+          </a:p>
+          <a:p>
+            <a:r>
+              <a:rPr lang="en-US" sz="2400" dirty="0"/>
+              <a:t>Cloud Accessibility: Deploying the model on a cloud platform ensures widespread access for hospitals and clinics, facilitating broader utilization and impact.</a:t>
+            </a:r>
+          </a:p>
+        </p:txBody>
+      </p:sp>
+    </p:spTree>
+    <p:extLst>
+      <p:ext uri="{BB962C8B-B14F-4D97-AF65-F5344CB8AC3E}">
+        <p14:creationId xmlns:p14="http://schemas.microsoft.com/office/powerpoint/2010/main" val="2621950647"/>
+      </p:ext>
+    </p:extLst>
+  </p:cSld>
+  <p:clrMapOvr>
+    <a:masterClrMapping/>
+  </p:clrMapOvr>
+</p:sld>
+</file>
+
 <file path=ppt/slides/slide3.xml><?xml version="1.0" encoding="utf-8"?>
 <p:sld xmlns:a="http://schemas.openxmlformats.org/drawingml/2006/main" xmlns:r="http://schemas.openxmlformats.org/officeDocument/2006/relationships" xmlns:p="http://schemas.openxmlformats.org/presentationml/2006/main">
   <p:cSld>
@@ -7734,10 +7880,9 @@
           <a:lstStyle/>
           <a:p>
             <a:r>
-              <a:rPr lang="en-US" sz="5400" dirty="0" smtClean="0"/>
+              <a:rPr lang="en-US" sz="5400" dirty="0"/>
               <a:t>objectives</a:t>
             </a:r>
-            <a:endParaRPr lang="en-US" sz="5400" dirty="0"/>
           </a:p>
         </p:txBody>
       </p:sp>
@@ -8155,10 +8300,9 @@
           <a:lstStyle/>
           <a:p>
             <a:r>
-              <a:rPr lang="en-US" sz="4400" dirty="0" smtClean="0"/>
+              <a:rPr lang="en-US" sz="4400" dirty="0"/>
               <a:t>Metric of success</a:t>
             </a:r>
-            <a:endParaRPr lang="en-US" sz="4400" dirty="0"/>
           </a:p>
         </p:txBody>
       </p:sp>
@@ -8194,36 +8338,20 @@
           </a:p>
           <a:p>
             <a:r>
-              <a:rPr lang="en-US" sz="2200" dirty="0" smtClean="0"/>
-              <a:t>Loss</a:t>
-            </a:r>
-            <a:r>
               <a:rPr lang="en-US" sz="2200" dirty="0"/>
-              <a:t>: This metric measures the error between the predicted values and the actual values. Lower loss indicates a better fitting model. We will use the test loss to evaluate the model's ability to generalize to new data.</a:t>
-            </a:r>
-          </a:p>
-          <a:p>
-            <a:r>
-              <a:rPr lang="en-US" sz="2200" dirty="0" smtClean="0"/>
-              <a:t>Accuracy</a:t>
-            </a:r>
+              <a:t>Loss: This metric measures the error between the predicted values and the actual values. Lower loss indicates a better fitting model. We will use the test loss to evaluate the model's ability to generalize to new data.</a:t>
+            </a:r>
+          </a:p>
+          <a:p>
             <a:r>
               <a:rPr lang="en-US" sz="2200" dirty="0"/>
-              <a:t>: This metric indicates the proportion of correctly classified instances out of the total instances. Higher accuracy indicates better model performance in terms of classification correctness.</a:t>
-            </a:r>
-          </a:p>
-          <a:p>
-            <a:r>
-              <a:rPr lang="en-US" sz="2200" dirty="0" smtClean="0"/>
-              <a:t>Precision</a:t>
-            </a:r>
-            <a:r>
-              <a:rPr lang="en-US" sz="2200" dirty="0"/>
-              <a:t>: This metric measures the accuracy of the positive predictions. It is the ratio of true positive predictions to the total positive predictions. Higher precision indicates that the model has a lower false positive rate.</a:t>
-            </a:r>
-          </a:p>
-          <a:p>
-            <a:endParaRPr lang="en-US" dirty="0"/>
+              <a:t>Accuracy: This metric indicates the proportion of correctly classified instances out of the total instances. Higher accuracy indicates better model performance in terms of classification </a:t>
+            </a:r>
+            <a:r>
+              <a:rPr lang="en-US" sz="2200"/>
+              <a:t>correctness.</a:t>
+            </a:r>
+            <a:endParaRPr lang="en-US" sz="2200" dirty="0"/>
           </a:p>
         </p:txBody>
       </p:sp>

</xml_diff>